<commit_message>
Clean-up iPython notebook and PowerPoint presentation for EDX UCSD Pyton For Data Science Mini-Project
</commit_message>
<xml_diff>
--- a/Python/UCSD/PythonForDataScience/Week6/DSE200X_MiniProject_AnimatedMovies.pptx
+++ b/Python/UCSD/PythonForDataScience/Week6/DSE200X_MiniProject_AnimatedMovies.pptx
@@ -220,6 +220,11 @@
       </a:defRPr>
     </a:lvl9pPr>
   </p:defaultTextStyle>
+  <p:extLst>
+    <p:ext uri="{EFAFB233-063F-42B5-8137-9DF3F51BA10A}">
+      <p15:sldGuideLst xmlns:p15="http://schemas.microsoft.com/office/powerpoint/2012/main"/>
+    </p:ext>
+  </p:extLst>
 </p:presentation>
 </file>
 
@@ -7701,33 +7706,7 @@
                 <a:ea typeface="+mn-ea"/>
                 <a:cs typeface="+mn-cs"/>
               </a:rPr>
-              <a:t>As we </a:t>
-            </a:r>
-            <a:r>
-              <a:rPr lang="en-US" sz="1500" kern="1200" dirty="0">
-                <a:solidFill>
-                  <a:schemeClr val="bg2">
-                    <a:lumMod val="50000"/>
-                  </a:schemeClr>
-                </a:solidFill>
-                <a:latin typeface="+mn-lt"/>
-                <a:ea typeface="+mn-ea"/>
-                <a:cs typeface="+mn-cs"/>
-              </a:rPr>
-              <a:t>can</a:t>
-            </a:r>
-            <a:r>
-              <a:rPr lang="en-US" sz="1500" kern="1200" dirty="0">
-                <a:solidFill>
-                  <a:schemeClr val="bg2">
-                    <a:lumMod val="50000"/>
-                  </a:schemeClr>
-                </a:solidFill>
-                <a:latin typeface="+mn-lt"/>
-                <a:ea typeface="+mn-ea"/>
-                <a:cs typeface="+mn-cs"/>
-              </a:rPr>
-              <a:t> see, both sampling distributions were relatively normal, and the non-children’s animated movies sampling distribution seemed to have a higher average than the </a:t>
+              <a:t>As we can see, both sampling distributions were relatively normal, and the non-children’s animated movies sampling distribution seemed to have a higher average than the </a:t>
             </a:r>
             <a:r>
               <a:rPr lang="en-US" sz="1500" kern="1200" dirty="0" smtClean="0">
@@ -7755,16 +7734,6 @@
               </a:rPr>
               <a:t>animated movies distribution.</a:t>
             </a:r>
-            <a:endParaRPr lang="en-US" sz="1500" kern="1200" dirty="0">
-              <a:solidFill>
-                <a:schemeClr val="bg2">
-                  <a:lumMod val="50000"/>
-                </a:schemeClr>
-              </a:solidFill>
-              <a:latin typeface="+mn-lt"/>
-              <a:ea typeface="+mn-ea"/>
-              <a:cs typeface="+mn-cs"/>
-            </a:endParaRPr>
           </a:p>
         </p:txBody>
       </p:sp>
@@ -7889,10 +7858,10 @@
               <a:buNone/>
             </a:pPr>
             <a:r>
-              <a:rPr lang="en" dirty="0" smtClean="0"/>
+              <a:rPr lang="en" sz="1300" dirty="0" smtClean="0"/>
               <a:t>Looking at boxplots was another way to see that non-childrens animated movies seemed to be more highly rated, but I had to make sure this difference was significant</a:t>
             </a:r>
-            <a:endParaRPr lang="en" dirty="0"/>
+            <a:endParaRPr lang="en" sz="1300" dirty="0"/>
           </a:p>
           <a:p>
             <a:pPr lvl="0">
@@ -7902,38 +7871,120 @@
               <a:buNone/>
             </a:pPr>
             <a:r>
-              <a:rPr lang="en" dirty="0" smtClean="0"/>
+              <a:rPr lang="en" sz="1300" dirty="0" smtClean="0"/>
               <a:t>I chose to do a one-tailed, independent samples t-test comparing both samples I had taken with the sample statistic displayed below, to the right of the boxplots</a:t>
             </a:r>
           </a:p>
           <a:p>
             <a:pPr lvl="0">
-              <a:spcBef>
-                <a:spcPts val="0"/>
-              </a:spcBef>
               <a:buNone/>
             </a:pPr>
             <a:r>
-              <a:rPr lang="en" dirty="0" smtClean="0"/>
-              <a:t>My null hypothesis [ </a:t>
-            </a:r>
-            <a:r>
-              <a:rPr lang="en" b="1" dirty="0" smtClean="0"/>
+              <a:rPr lang="en" sz="1300" dirty="0" smtClean="0"/>
+              <a:t>My null </a:t>
+            </a:r>
+            <a:r>
+              <a:rPr lang="en" sz="1300" dirty="0" smtClean="0"/>
+              <a:t>hypothesis [ </a:t>
+            </a:r>
+            <a:r>
+              <a:rPr lang="en" sz="1300" b="1" dirty="0" smtClean="0"/>
               <a:t>H(0)</a:t>
             </a:r>
             <a:r>
-              <a:rPr lang="en" dirty="0" smtClean="0"/>
-              <a:t> ] was that the difference in mean animated movie ratings was 0 (i.e. the ratings were not significanly different), and my alternative hypothesis [ </a:t>
-            </a:r>
-            <a:r>
-              <a:rPr lang="en" b="1" dirty="0" smtClean="0"/>
+              <a:rPr lang="en" sz="1300" dirty="0" smtClean="0"/>
+              <a:t> ] was that the difference in </a:t>
+            </a:r>
+            <a:r>
+              <a:rPr lang="en" sz="1300" dirty="0" smtClean="0"/>
+              <a:t>mean animated </a:t>
+            </a:r>
+            <a:r>
+              <a:rPr lang="en" sz="1300" dirty="0" smtClean="0"/>
+              <a:t>movie ratings was </a:t>
+            </a:r>
+            <a:r>
+              <a:rPr lang="en" sz="1300" dirty="0" smtClean="0"/>
+              <a:t>0 or greater than 0 </a:t>
+            </a:r>
+            <a:r>
+              <a:rPr lang="en" sz="1300" dirty="0" smtClean="0"/>
+              <a:t>(i.e. </a:t>
+            </a:r>
+            <a:r>
+              <a:rPr lang="en" sz="1300" dirty="0" smtClean="0"/>
+              <a:t>ratings were not significantly different</a:t>
+            </a:r>
+            <a:r>
+              <a:rPr lang="en-US" sz="1300" dirty="0"/>
+              <a:t> </a:t>
+            </a:r>
+            <a:r>
+              <a:rPr lang="en-US" sz="1300" dirty="0" smtClean="0"/>
+              <a:t>OR the mean animated </a:t>
+            </a:r>
+            <a:r>
+              <a:rPr lang="en-US" sz="1300" dirty="0"/>
+              <a:t>children's </a:t>
+            </a:r>
+            <a:r>
+              <a:rPr lang="en-US" sz="1300" dirty="0" smtClean="0"/>
+              <a:t>movie rating was significantly </a:t>
+            </a:r>
+            <a:r>
+              <a:rPr lang="en-US" sz="1300" dirty="0"/>
+              <a:t>higher than </a:t>
+            </a:r>
+            <a:r>
+              <a:rPr lang="en-US" sz="1300" dirty="0" smtClean="0"/>
+              <a:t>the mean animated </a:t>
+            </a:r>
+            <a:r>
+              <a:rPr lang="en-US" sz="1300" dirty="0"/>
+              <a:t>non-children's </a:t>
+            </a:r>
+            <a:r>
+              <a:rPr lang="en-US" sz="1300" dirty="0" smtClean="0"/>
+              <a:t>movie rating</a:t>
+            </a:r>
+            <a:r>
+              <a:rPr lang="en" sz="1300" dirty="0" smtClean="0"/>
+              <a:t>)</a:t>
+            </a:r>
+          </a:p>
+          <a:p>
+            <a:pPr lvl="0">
+              <a:buNone/>
+            </a:pPr>
+            <a:r>
+              <a:rPr lang="en" sz="1300" dirty="0" smtClean="0"/>
+              <a:t>My </a:t>
+            </a:r>
+            <a:r>
+              <a:rPr lang="en" sz="1300" dirty="0" smtClean="0"/>
+              <a:t>alternative hypothesis[ </a:t>
+            </a:r>
+            <a:r>
+              <a:rPr lang="en" sz="1300" b="1" dirty="0" smtClean="0"/>
               <a:t>H(A)</a:t>
             </a:r>
             <a:r>
-              <a:rPr lang="en" dirty="0" smtClean="0"/>
-              <a:t> ] was that there was a difference in ratings between animated movies and it was significant.</a:t>
-            </a:r>
-            <a:endParaRPr lang="en" dirty="0"/>
+              <a:rPr lang="en" sz="1300" dirty="0" smtClean="0"/>
+              <a:t> ] was that the mean </a:t>
+            </a:r>
+            <a:r>
+              <a:rPr lang="en-US" sz="1300" dirty="0" smtClean="0"/>
+              <a:t>non-children's animated movies rating was significantly higher than the </a:t>
+            </a:r>
+            <a:r>
+              <a:rPr lang="en" sz="1300" dirty="0" smtClean="0"/>
+              <a:t>mean </a:t>
+            </a:r>
+            <a:r>
+              <a:rPr lang="en-US" sz="1300" dirty="0" smtClean="0"/>
+              <a:t>children's animated movies rating</a:t>
+            </a:r>
+            <a:endParaRPr lang="en" sz="1300" dirty="0"/>
           </a:p>
         </p:txBody>
       </p:sp>
@@ -7959,7 +8010,7 @@
         </p:blipFill>
         <p:spPr>
           <a:xfrm>
-            <a:off x="311700" y="3104691"/>
+            <a:off x="390641" y="3131005"/>
             <a:ext cx="5063864" cy="1899815"/>
           </a:xfrm>
           <a:prstGeom prst="rect">
@@ -8214,17 +8265,7 @@
                 <a:latin typeface="Gulim" panose="020B0600000101010101" pitchFamily="34" charset="-127"/>
                 <a:ea typeface="Gulim" panose="020B0600000101010101" pitchFamily="34" charset="-127"/>
               </a:rPr>
-              <a:t>* one-tailed because I was just looking for a differenc</a:t>
-            </a:r>
-            <a:r>
-              <a:rPr lang="en-US" sz="1200" dirty="0" smtClean="0">
-                <a:solidFill>
-                  <a:schemeClr val="tx1"/>
-                </a:solidFill>
-                <a:latin typeface="Gulim" panose="020B0600000101010101" pitchFamily="34" charset="-127"/>
-                <a:ea typeface="Gulim" panose="020B0600000101010101" pitchFamily="34" charset="-127"/>
-              </a:rPr>
-              <a:t>e between the sample means in a certain direction</a:t>
+              <a:t>* one-tailed because I was just looking for a difference between the sample means in a certain direction</a:t>
             </a:r>
             <a:endParaRPr lang="en" sz="1200" dirty="0">
               <a:solidFill>

</xml_diff>